<commit_message>
atualizado o status report
</commit_message>
<xml_diff>
--- a/Documentação/Status Report/2022-1/Status Report 2.pptx
+++ b/Documentação/Status Report/2022-1/Status Report 2.pptx
@@ -21728,25 +21728,8 @@
                 <a:latin typeface="Simplon Oi Headline"/>
                 <a:cs typeface="Simplon Oi Headline"/>
               </a:rPr>
-              <a:t>SEMANA 1 </a:t>
+              <a:t>SEMANA 1 - 16/02/2022 – 23/02/2022</a:t>
             </a:r>
-            <a:r>
-              <a:rPr lang="en-US" sz="2646">
-                <a:solidFill>
-                  <a:prstClr val="black"/>
-                </a:solidFill>
-                <a:latin typeface="Simplon Oi Headline"/>
-                <a:cs typeface="Simplon Oi Headline"/>
-              </a:rPr>
-              <a:t>- 16/02/2022 – 23/02/2022</a:t>
-            </a:r>
-            <a:endParaRPr lang="en-US" sz="2646" dirty="0">
-              <a:solidFill>
-                <a:prstClr val="black"/>
-              </a:solidFill>
-              <a:latin typeface="Simplon Oi Headline"/>
-              <a:cs typeface="Simplon Oi Headline"/>
-            </a:endParaRPr>
           </a:p>
         </p:txBody>
       </p:sp>
@@ -22605,7 +22588,7 @@
           <a:bodyPr tIns="105844" rtlCol="0" anchor="t"/>
           <a:lstStyle/>
           <a:p>
-            <a:pPr marL="252049" lvl="1" indent="-252049" fontAlgn="base">
+            <a:pPr marL="252049" indent="-252049" fontAlgn="base">
               <a:spcBef>
                 <a:spcPct val="0"/>
               </a:spcBef>
@@ -22614,27 +22597,17 @@
               <a:defRPr/>
             </a:pPr>
             <a:r>
-              <a:rPr lang="pt-BR" sz="1323" b="1" dirty="0">
+              <a:rPr lang="pt-BR" sz="1320" b="1" dirty="0">
                 <a:solidFill>
                   <a:schemeClr val="tx1"/>
                 </a:solidFill>
                 <a:latin typeface="Calibri" panose="020F0502020204030204" pitchFamily="34" charset="0"/>
                 <a:cs typeface="Simplon BP Regular"/>
               </a:rPr>
-              <a:t>Montagem do mapa de persona (Administrador e Usuário);</a:t>
+              <a:t>Terminado o </a:t>
             </a:r>
-          </a:p>
-          <a:p>
-            <a:pPr marL="252049" lvl="1" indent="-252049" fontAlgn="base">
-              <a:spcBef>
-                <a:spcPct val="0"/>
-              </a:spcBef>
-              <a:buFont typeface="Wingdings" panose="05000000000000000000" pitchFamily="2" charset="2"/>
-              <a:buChar char="ü"/>
-              <a:defRPr/>
-            </a:pPr>
             <a:r>
-              <a:rPr lang="pt-BR" sz="1323" b="1" dirty="0" err="1">
+              <a:rPr lang="pt-BR" sz="1320" b="1" dirty="0" err="1">
                 <a:solidFill>
                   <a:schemeClr val="tx1"/>
                 </a:solidFill>
@@ -22644,7 +22617,7 @@
               <a:t>Canvas</a:t>
             </a:r>
             <a:r>
-              <a:rPr lang="pt-BR" sz="1323" b="1" dirty="0">
+              <a:rPr lang="pt-BR" sz="1320" b="1" dirty="0">
                 <a:solidFill>
                   <a:schemeClr val="tx1"/>
                 </a:solidFill>
@@ -22671,18 +22644,190 @@
                 <a:latin typeface="Calibri" panose="020F0502020204030204" pitchFamily="34" charset="0"/>
                 <a:cs typeface="Simplon BP Regular"/>
               </a:rPr>
-              <a:t>Definir e designar funções dos integrantes do </a:t>
+              <a:t>Feito o </a:t>
             </a:r>
             <a:r>
-              <a:rPr lang="pt-BR" sz="1320" b="1">
+              <a:rPr lang="pt-BR" sz="1320" b="1" dirty="0" err="1">
                 <a:solidFill>
                   <a:schemeClr val="tx1"/>
                 </a:solidFill>
                 <a:latin typeface="Calibri" panose="020F0502020204030204" pitchFamily="34" charset="0"/>
                 <a:cs typeface="Simplon BP Regular"/>
               </a:rPr>
-              <a:t>grupo;</a:t>
+              <a:t>Personal</a:t>
             </a:r>
+            <a:r>
+              <a:rPr lang="pt-BR" sz="1320" b="1" dirty="0">
+                <a:solidFill>
+                  <a:schemeClr val="tx1"/>
+                </a:solidFill>
+                <a:latin typeface="Calibri" panose="020F0502020204030204" pitchFamily="34" charset="0"/>
+                <a:cs typeface="Simplon BP Regular"/>
+              </a:rPr>
+              <a:t> </a:t>
+            </a:r>
+            <a:r>
+              <a:rPr lang="pt-BR" sz="1320" b="1" dirty="0" err="1">
+                <a:solidFill>
+                  <a:schemeClr val="tx1"/>
+                </a:solidFill>
+                <a:latin typeface="Calibri" panose="020F0502020204030204" pitchFamily="34" charset="0"/>
+                <a:cs typeface="Simplon BP Regular"/>
+              </a:rPr>
+              <a:t>Canvas</a:t>
+            </a:r>
+            <a:r>
+              <a:rPr lang="pt-BR" sz="1320" b="1" dirty="0">
+                <a:solidFill>
+                  <a:schemeClr val="tx1"/>
+                </a:solidFill>
+                <a:latin typeface="Calibri" panose="020F0502020204030204" pitchFamily="34" charset="0"/>
+                <a:cs typeface="Simplon BP Regular"/>
+              </a:rPr>
+              <a:t> do Administrador</a:t>
+            </a:r>
+          </a:p>
+          <a:p>
+            <a:pPr marL="252049" indent="-252049" fontAlgn="base">
+              <a:spcBef>
+                <a:spcPct val="0"/>
+              </a:spcBef>
+              <a:buFont typeface="Wingdings" panose="05000000000000000000" pitchFamily="2" charset="2"/>
+              <a:buChar char="ü"/>
+              <a:defRPr/>
+            </a:pPr>
+            <a:r>
+              <a:rPr lang="pt-BR" sz="1320" b="1" dirty="0">
+                <a:solidFill>
+                  <a:schemeClr val="tx1"/>
+                </a:solidFill>
+                <a:latin typeface="Calibri" panose="020F0502020204030204" pitchFamily="34" charset="0"/>
+                <a:cs typeface="Simplon BP Regular"/>
+              </a:rPr>
+              <a:t>Terminado o PM </a:t>
+            </a:r>
+            <a:r>
+              <a:rPr lang="pt-BR" sz="1320" b="1" dirty="0" err="1">
+                <a:solidFill>
+                  <a:schemeClr val="tx1"/>
+                </a:solidFill>
+                <a:latin typeface="Calibri" panose="020F0502020204030204" pitchFamily="34" charset="0"/>
+                <a:cs typeface="Simplon BP Regular"/>
+              </a:rPr>
+              <a:t>Canvas</a:t>
+            </a:r>
+            <a:endParaRPr lang="pt-BR" sz="1320" b="1" dirty="0">
+              <a:solidFill>
+                <a:schemeClr val="tx1"/>
+              </a:solidFill>
+              <a:latin typeface="Calibri" panose="020F0502020204030204" pitchFamily="34" charset="0"/>
+              <a:cs typeface="Simplon BP Regular"/>
+            </a:endParaRPr>
+          </a:p>
+          <a:p>
+            <a:pPr marL="252049" indent="-252049" fontAlgn="base">
+              <a:spcBef>
+                <a:spcPct val="0"/>
+              </a:spcBef>
+              <a:buFont typeface="Wingdings" panose="05000000000000000000" pitchFamily="2" charset="2"/>
+              <a:buChar char="ü"/>
+              <a:defRPr/>
+            </a:pPr>
+            <a:r>
+              <a:rPr lang="pt-BR" sz="1320" b="1" dirty="0" err="1">
+                <a:solidFill>
+                  <a:schemeClr val="tx1"/>
+                </a:solidFill>
+                <a:latin typeface="Calibri" panose="020F0502020204030204" pitchFamily="34" charset="0"/>
+                <a:cs typeface="Simplon BP Regular"/>
+              </a:rPr>
+              <a:t>Planner</a:t>
+            </a:r>
+            <a:r>
+              <a:rPr lang="pt-BR" sz="1320" b="1" dirty="0">
+                <a:solidFill>
+                  <a:schemeClr val="tx1"/>
+                </a:solidFill>
+                <a:latin typeface="Calibri" panose="020F0502020204030204" pitchFamily="34" charset="0"/>
+                <a:cs typeface="Simplon BP Regular"/>
+              </a:rPr>
+              <a:t> atualizado</a:t>
+            </a:r>
+          </a:p>
+          <a:p>
+            <a:pPr marL="252049" indent="-252049" fontAlgn="base">
+              <a:spcBef>
+                <a:spcPct val="0"/>
+              </a:spcBef>
+              <a:buFont typeface="Wingdings" panose="05000000000000000000" pitchFamily="2" charset="2"/>
+              <a:buChar char="ü"/>
+              <a:defRPr/>
+            </a:pPr>
+            <a:r>
+              <a:rPr lang="pt-BR" sz="1320" b="1" dirty="0">
+                <a:solidFill>
+                  <a:schemeClr val="tx1"/>
+                </a:solidFill>
+                <a:latin typeface="Calibri" panose="020F0502020204030204" pitchFamily="34" charset="0"/>
+                <a:cs typeface="Simplon BP Regular"/>
+              </a:rPr>
+              <a:t>Organização interna das </a:t>
+            </a:r>
+            <a:r>
+              <a:rPr lang="pt-BR" sz="1320" b="1" dirty="0" err="1">
+                <a:solidFill>
+                  <a:schemeClr val="tx1"/>
+                </a:solidFill>
+                <a:latin typeface="Calibri" panose="020F0502020204030204" pitchFamily="34" charset="0"/>
+                <a:cs typeface="Simplon BP Regular"/>
+              </a:rPr>
+              <a:t>branchs</a:t>
+            </a:r>
+            <a:r>
+              <a:rPr lang="pt-BR" sz="1320" b="1" dirty="0">
+                <a:solidFill>
+                  <a:schemeClr val="tx1"/>
+                </a:solidFill>
+                <a:latin typeface="Calibri" panose="020F0502020204030204" pitchFamily="34" charset="0"/>
+                <a:cs typeface="Simplon BP Regular"/>
+              </a:rPr>
+              <a:t> do </a:t>
+            </a:r>
+            <a:r>
+              <a:rPr lang="pt-BR" sz="1320" b="1" dirty="0" err="1">
+                <a:solidFill>
+                  <a:schemeClr val="tx1"/>
+                </a:solidFill>
+                <a:latin typeface="Calibri" panose="020F0502020204030204" pitchFamily="34" charset="0"/>
+                <a:cs typeface="Simplon BP Regular"/>
+              </a:rPr>
+              <a:t>projeno</a:t>
+            </a:r>
+            <a:r>
+              <a:rPr lang="pt-BR" sz="1320" b="1" dirty="0">
+                <a:solidFill>
+                  <a:schemeClr val="tx1"/>
+                </a:solidFill>
+                <a:latin typeface="Calibri" panose="020F0502020204030204" pitchFamily="34" charset="0"/>
+                <a:cs typeface="Simplon BP Regular"/>
+              </a:rPr>
+              <a:t> no GitHub</a:t>
+            </a:r>
+          </a:p>
+          <a:p>
+            <a:pPr fontAlgn="base">
+              <a:spcBef>
+                <a:spcPct val="0"/>
+              </a:spcBef>
+              <a:defRPr/>
+            </a:pPr>
+            <a:endParaRPr lang="pt-BR" sz="1320" b="1" dirty="0">
+              <a:solidFill>
+                <a:schemeClr val="tx1"/>
+              </a:solidFill>
+              <a:latin typeface="Calibri" panose="020F0502020204030204" pitchFamily="34" charset="0"/>
+              <a:cs typeface="Simplon BP Regular"/>
+            </a:endParaRPr>
           </a:p>
           <a:p>
             <a:pPr marL="252049" indent="-252049" fontAlgn="base">
@@ -22746,7 +22891,7 @@
         <p:spPr>
           <a:xfrm>
             <a:off x="6844996" y="1121895"/>
-            <a:ext cx="6164295" cy="499496"/>
+            <a:ext cx="6164295" cy="295915"/>
           </a:xfrm>
           <a:prstGeom prst="rect">
             <a:avLst/>
@@ -22772,23 +22917,6 @@
                 <a:cs typeface="Simplon BP Regular"/>
               </a:rPr>
               <a:t>Agenda para reuniões fixas da equipe não foi definida;</a:t>
-            </a:r>
-          </a:p>
-          <a:p>
-            <a:pPr marL="252049" indent="-252049" fontAlgn="base">
-              <a:spcBef>
-                <a:spcPct val="0"/>
-              </a:spcBef>
-              <a:buFont typeface="Wingdings" panose="05000000000000000000" pitchFamily="2" charset="2"/>
-              <a:buChar char="§"/>
-              <a:defRPr/>
-            </a:pPr>
-            <a:r>
-              <a:rPr lang="pt-BR" sz="1323" b="1" dirty="0">
-                <a:latin typeface="Calibri" panose="020F0502020204030204" pitchFamily="34" charset="0"/>
-                <a:cs typeface="Simplon BP Regular"/>
-              </a:rPr>
-              <a:t>Configuração AWS </a:t>
             </a:r>
           </a:p>
         </p:txBody>
@@ -22958,75 +23086,7 @@
             </a:r>
           </a:p>
           <a:p>
-            <a:pPr marL="252049" lvl="1" indent="-252049">
-              <a:buFont typeface="Wingdings" panose="05000000000000000000" pitchFamily="2" charset="2"/>
-              <a:buChar char="§"/>
-            </a:pPr>
-            <a:r>
-              <a:rPr lang="pt-BR" sz="1400" dirty="0">
-                <a:solidFill>
-                  <a:schemeClr val="tx1"/>
-                </a:solidFill>
-                <a:latin typeface="Calibri" panose="020F0502020204030204" pitchFamily="34" charset="0"/>
-                <a:cs typeface="Simplon BP Regular"/>
-              </a:rPr>
-              <a:t>Identificar como alcançar um bom UX</a:t>
-            </a:r>
-          </a:p>
-          <a:p>
-            <a:pPr marL="0" lvl="1"/>
-            <a:r>
-              <a:rPr lang="pt-BR" sz="1400" dirty="0">
-                <a:solidFill>
-                  <a:schemeClr val="tx1"/>
-                </a:solidFill>
-                <a:latin typeface="Calibri" panose="020F0502020204030204" pitchFamily="34" charset="0"/>
-                <a:cs typeface="Simplon BP Regular"/>
-              </a:rPr>
-              <a:t>      para nossos usuários ;</a:t>
-            </a:r>
-          </a:p>
-          <a:p>
-            <a:pPr marL="285750" lvl="1" indent="-285750">
-              <a:buFont typeface="Wingdings" panose="05000000000000000000" pitchFamily="2" charset="2"/>
-              <a:buChar char="§"/>
-            </a:pPr>
-            <a:r>
-              <a:rPr lang="pt-BR" sz="1400" dirty="0">
-                <a:solidFill>
-                  <a:schemeClr val="tx1"/>
-                </a:solidFill>
-                <a:latin typeface="Calibri" panose="020F0502020204030204" pitchFamily="34" charset="0"/>
-                <a:cs typeface="Simplon BP Regular"/>
-              </a:rPr>
-              <a:t>Organizar agenda do grupo e atualizar o </a:t>
-            </a:r>
-            <a:r>
-              <a:rPr lang="pt-BR" sz="1400" dirty="0" err="1">
-                <a:solidFill>
-                  <a:schemeClr val="tx1"/>
-                </a:solidFill>
-                <a:latin typeface="Calibri" panose="020F0502020204030204" pitchFamily="34" charset="0"/>
-                <a:cs typeface="Simplon BP Regular"/>
-              </a:rPr>
-              <a:t>Planner</a:t>
-            </a:r>
-            <a:r>
-              <a:rPr lang="pt-BR" sz="1400" dirty="0">
-                <a:solidFill>
-                  <a:schemeClr val="tx1"/>
-                </a:solidFill>
-                <a:latin typeface="Calibri" panose="020F0502020204030204" pitchFamily="34" charset="0"/>
-                <a:cs typeface="Simplon BP Regular"/>
-              </a:rPr>
-              <a:t>( Ferramenta para gestão utilizada pelo grupo);</a:t>
-            </a:r>
-          </a:p>
-          <a:p>
-            <a:pPr marL="285750" lvl="1" indent="-285750">
-              <a:buFont typeface="Wingdings" panose="05000000000000000000" pitchFamily="2" charset="2"/>
-              <a:buChar char="§"/>
-            </a:pPr>
+            <a:pPr marL="0" lvl="1" defTabSz="672130"/>
             <a:endParaRPr lang="pt-BR" sz="1400" b="1" dirty="0">
               <a:solidFill>
                 <a:schemeClr val="tx1"/>
@@ -23061,56 +23121,8 @@
                 <a:latin typeface="Calibri" panose="020F0502020204030204" pitchFamily="34" charset="0"/>
                 <a:cs typeface="Simplon BP Regular"/>
               </a:rPr>
-              <a:t>Definir agenda semanal da equipe;</a:t>
+              <a:t>Definir a agenda semanal de reuniões.</a:t>
             </a:r>
-          </a:p>
-          <a:p>
-            <a:pPr marL="285750" lvl="1" indent="-285750">
-              <a:buFont typeface="Arial" panose="020B0604020202020204" pitchFamily="34" charset="0"/>
-              <a:buChar char="•"/>
-            </a:pPr>
-            <a:r>
-              <a:rPr lang="pt-BR" sz="1400" dirty="0">
-                <a:solidFill>
-                  <a:schemeClr val="tx1"/>
-                </a:solidFill>
-                <a:latin typeface="Calibri" panose="020F0502020204030204" pitchFamily="34" charset="0"/>
-                <a:cs typeface="Simplon BP Regular"/>
-              </a:rPr>
-              <a:t>Concluir a </a:t>
-            </a:r>
-            <a:r>
-              <a:rPr lang="pt-BR" sz="1400" dirty="0">
-                <a:solidFill>
-                  <a:schemeClr val="tx1"/>
-                </a:solidFill>
-                <a:latin typeface="Calibri" panose="020F0502020204030204" pitchFamily="34" charset="0"/>
-                <a:cs typeface="Arial" panose="020B0604020202020204" pitchFamily="34" charset="0"/>
-              </a:rPr>
-              <a:t>m</a:t>
-            </a:r>
-            <a:r>
-              <a:rPr lang="pt-BR" sz="1400" dirty="0">
-                <a:solidFill>
-                  <a:schemeClr val="tx1"/>
-                </a:solidFill>
-                <a:cs typeface="Arial" panose="020B0604020202020204" pitchFamily="34" charset="0"/>
-              </a:rPr>
-              <a:t>ontagem da matriz de concorrência;</a:t>
-            </a:r>
-          </a:p>
-          <a:p>
-            <a:pPr marL="285750" lvl="1" indent="-285750">
-              <a:buFont typeface="Arial" panose="020B0604020202020204" pitchFamily="34" charset="0"/>
-              <a:buChar char="•"/>
-            </a:pPr>
-            <a:endParaRPr lang="pt-BR" sz="1400" dirty="0">
-              <a:solidFill>
-                <a:schemeClr val="tx1"/>
-              </a:solidFill>
-              <a:latin typeface="Calibri" panose="020F0502020204030204" pitchFamily="34" charset="0"/>
-              <a:cs typeface="Simplon BP Regular"/>
-            </a:endParaRPr>
           </a:p>
         </p:txBody>
       </p:sp>
@@ -24995,6 +25007,15 @@
 </file>
 
 <file path=customXml/item2.xml><?xml version="1.0" encoding="utf-8"?>
+<?mso-contentType ?>
+<FormTemplates xmlns="http://schemas.microsoft.com/sharepoint/v3/contenttype/forms">
+  <Display>DocumentLibraryForm</Display>
+  <Edit>DocumentLibraryForm</Edit>
+  <New>DocumentLibraryForm</New>
+</FormTemplates>
+</file>
+
+<file path=customXml/item3.xml><?xml version="1.0" encoding="utf-8"?>
 <ct:contentTypeSchema xmlns:ct="http://schemas.microsoft.com/office/2006/metadata/contentType" xmlns:ma="http://schemas.microsoft.com/office/2006/metadata/properties/metaAttributes" ct:_="" ma:_="" ma:contentTypeName="Document" ma:contentTypeID="0x0101001132905C37EA9847A7207C4BBCCCD8F4" ma:contentTypeVersion="34" ma:contentTypeDescription="Create a new document." ma:contentTypeScope="" ma:versionID="2f28daba72ca6e92be87ea70ebe5bb94">
   <xsd:schema xmlns:xsd="http://www.w3.org/2001/XMLSchema" xmlns:xs="http://www.w3.org/2001/XMLSchema" xmlns:p="http://schemas.microsoft.com/office/2006/metadata/properties" xmlns:ns3="4327b14a-fe89-488e-9f6d-9658cacf372b" xmlns:ns4="bbcd8c33-6940-4d4c-a587-bbc736ca1e4d" targetNamespace="http://schemas.microsoft.com/office/2006/metadata/properties" ma:root="true" ma:fieldsID="df18e839ce2650f1975b41376e6cdb6b" ns3:_="" ns4:_="">
     <xsd:import namespace="4327b14a-fe89-488e-9f6d-9658cacf372b"/>
@@ -25411,15 +25432,6 @@
 </ct:contentTypeSchema>
 </file>
 
-<file path=customXml/item3.xml><?xml version="1.0" encoding="utf-8"?>
-<?mso-contentType ?>
-<FormTemplates xmlns="http://schemas.microsoft.com/sharepoint/v3/contenttype/forms">
-  <Display>DocumentLibraryForm</Display>
-  <Edit>DocumentLibraryForm</Edit>
-  <New>DocumentLibraryForm</New>
-</FormTemplates>
-</file>
-
 <file path=customXml/itemProps1.xml><?xml version="1.0" encoding="utf-8"?>
 <ds:datastoreItem xmlns:ds="http://schemas.openxmlformats.org/officeDocument/2006/customXml" ds:itemID="{4B31267F-D399-4A8A-87F8-B75F56828412}">
   <ds:schemaRefs>
@@ -25438,6 +25450,14 @@
 </file>
 
 <file path=customXml/itemProps2.xml><?xml version="1.0" encoding="utf-8"?>
+<ds:datastoreItem xmlns:ds="http://schemas.openxmlformats.org/officeDocument/2006/customXml" ds:itemID="{E2481852-F24E-4532-AF30-C154D705D105}">
+  <ds:schemaRefs>
+    <ds:schemaRef ds:uri="http://schemas.microsoft.com/sharepoint/v3/contenttype/forms"/>
+  </ds:schemaRefs>
+</ds:datastoreItem>
+</file>
+
+<file path=customXml/itemProps3.xml><?xml version="1.0" encoding="utf-8"?>
 <ds:datastoreItem xmlns:ds="http://schemas.openxmlformats.org/officeDocument/2006/customXml" ds:itemID="{3BE6CAF6-1F55-4A70-B10C-21633F74987A}">
   <ds:schemaRefs>
     <ds:schemaRef ds:uri="http://schemas.microsoft.com/office/2006/metadata/contentType"/>
@@ -25454,12 +25474,4 @@
     <ds:schemaRef ds:uri="http://schemas.microsoft.com/internal/obd"/>
   </ds:schemaRefs>
 </ds:datastoreItem>
-</file>
-
-<file path=customXml/itemProps3.xml><?xml version="1.0" encoding="utf-8"?>
-<ds:datastoreItem xmlns:ds="http://schemas.openxmlformats.org/officeDocument/2006/customXml" ds:itemID="{E2481852-F24E-4532-AF30-C154D705D105}">
-  <ds:schemaRefs>
-    <ds:schemaRef ds:uri="http://schemas.microsoft.com/sharepoint/v3/contenttype/forms"/>
-  </ds:schemaRefs>
-</ds:datastoreItem>
 </file>
</xml_diff>